<commit_message>
Updated day 1 slides
</commit_message>
<xml_diff>
--- a/Slides/MSA Intro Day 1.pptx
+++ b/Slides/MSA Intro Day 1.pptx
@@ -5,19 +5,18 @@
     <p:sldMasterId id="2147483648" r:id="rId1"/>
   </p:sldMasterIdLst>
   <p:notesMasterIdLst>
-    <p:notesMasterId r:id="rId12"/>
+    <p:notesMasterId r:id="rId11"/>
   </p:notesMasterIdLst>
   <p:sldIdLst>
     <p:sldId id="278" r:id="rId2"/>
-    <p:sldId id="312" r:id="rId3"/>
-    <p:sldId id="292" r:id="rId4"/>
-    <p:sldId id="311" r:id="rId5"/>
-    <p:sldId id="268" r:id="rId6"/>
-    <p:sldId id="269" r:id="rId7"/>
-    <p:sldId id="272" r:id="rId8"/>
-    <p:sldId id="309" r:id="rId9"/>
-    <p:sldId id="293" r:id="rId10"/>
-    <p:sldId id="273" r:id="rId11"/>
+    <p:sldId id="292" r:id="rId3"/>
+    <p:sldId id="311" r:id="rId4"/>
+    <p:sldId id="268" r:id="rId5"/>
+    <p:sldId id="269" r:id="rId6"/>
+    <p:sldId id="272" r:id="rId7"/>
+    <p:sldId id="309" r:id="rId8"/>
+    <p:sldId id="293" r:id="rId9"/>
+    <p:sldId id="273" r:id="rId10"/>
   </p:sldIdLst>
   <p:sldSz cx="12192000" cy="6858000"/>
   <p:notesSz cx="6858000" cy="9144000"/>
@@ -217,7 +216,7 @@
           <a:p>
             <a:fld id="{53D551F1-3E25-2744-9BE7-0A04F579F8FB}" type="datetimeFigureOut">
               <a:rPr lang="en-US" smtClean="0"/>
-              <a:t>7/19/19</a:t>
+              <a:t>7/20/19</a:t>
             </a:fld>
             <a:endParaRPr lang="en-US"/>
           </a:p>
@@ -555,7 +554,7 @@
           <a:p>
             <a:fld id="{D3F8F6B0-B250-4748-A00E-B11C9B2F4421}" type="slidenum">
               <a:rPr lang="en-US" smtClean="0"/>
-              <a:t>3</a:t>
+              <a:t>2</a:t>
             </a:fld>
             <a:endParaRPr lang="en-US"/>
           </a:p>
@@ -644,7 +643,7 @@
           <a:p>
             <a:fld id="{D3F8F6B0-B250-4748-A00E-B11C9B2F4421}" type="slidenum">
               <a:rPr lang="en-US" smtClean="0"/>
-              <a:t>4</a:t>
+              <a:t>3</a:t>
             </a:fld>
             <a:endParaRPr lang="en-US"/>
           </a:p>
@@ -731,7 +730,7 @@
           <a:p>
             <a:fld id="{A008DDF4-253B-4E36-BE28-46B8E6426B7B}" type="slidenum">
               <a:rPr lang="en-US" smtClean="0"/>
-              <a:t>5</a:t>
+              <a:t>4</a:t>
             </a:fld>
             <a:endParaRPr lang="en-US"/>
           </a:p>
@@ -815,7 +814,7 @@
           <a:p>
             <a:fld id="{A008DDF4-253B-4E36-BE28-46B8E6426B7B}" type="slidenum">
               <a:rPr lang="en-US" smtClean="0"/>
-              <a:t>6</a:t>
+              <a:t>5</a:t>
             </a:fld>
             <a:endParaRPr lang="en-US"/>
           </a:p>
@@ -899,7 +898,7 @@
           <a:p>
             <a:fld id="{A008DDF4-253B-4E36-BE28-46B8E6426B7B}" type="slidenum">
               <a:rPr lang="en-US" smtClean="0"/>
-              <a:t>7</a:t>
+              <a:t>6</a:t>
             </a:fld>
             <a:endParaRPr lang="en-US"/>
           </a:p>
@@ -986,7 +985,7 @@
           <a:p>
             <a:fld id="{CDDFCC0C-D0C0-7443-B7C0-AFE35D3A82E0}" type="slidenum">
               <a:rPr lang="en-US" smtClean="0"/>
-              <a:t>9</a:t>
+              <a:t>8</a:t>
             </a:fld>
             <a:endParaRPr lang="en-US"/>
           </a:p>
@@ -1136,7 +1135,7 @@
           <a:p>
             <a:fld id="{F4356D17-FE2B-4A42-AE6B-E0B8894B79EA}" type="datetimeFigureOut">
               <a:rPr lang="en-US" smtClean="0"/>
-              <a:t>7/19/19</a:t>
+              <a:t>7/20/19</a:t>
             </a:fld>
             <a:endParaRPr lang="en-US"/>
           </a:p>
@@ -1306,7 +1305,7 @@
           <a:p>
             <a:fld id="{F4356D17-FE2B-4A42-AE6B-E0B8894B79EA}" type="datetimeFigureOut">
               <a:rPr lang="en-US" smtClean="0"/>
-              <a:t>7/19/19</a:t>
+              <a:t>7/20/19</a:t>
             </a:fld>
             <a:endParaRPr lang="en-US"/>
           </a:p>
@@ -1486,7 +1485,7 @@
           <a:p>
             <a:fld id="{F4356D17-FE2B-4A42-AE6B-E0B8894B79EA}" type="datetimeFigureOut">
               <a:rPr lang="en-US" smtClean="0"/>
-              <a:t>7/19/19</a:t>
+              <a:t>7/20/19</a:t>
             </a:fld>
             <a:endParaRPr lang="en-US"/>
           </a:p>
@@ -1980,7 +1979,7 @@
           <a:p>
             <a:fld id="{F4356D17-FE2B-4A42-AE6B-E0B8894B79EA}" type="datetimeFigureOut">
               <a:rPr lang="en-US" smtClean="0"/>
-              <a:t>7/19/19</a:t>
+              <a:t>7/20/19</a:t>
             </a:fld>
             <a:endParaRPr lang="en-US"/>
           </a:p>
@@ -2226,7 +2225,7 @@
           <a:p>
             <a:fld id="{F4356D17-FE2B-4A42-AE6B-E0B8894B79EA}" type="datetimeFigureOut">
               <a:rPr lang="en-US" smtClean="0"/>
-              <a:t>7/19/19</a:t>
+              <a:t>7/20/19</a:t>
             </a:fld>
             <a:endParaRPr lang="en-US"/>
           </a:p>
@@ -2458,7 +2457,7 @@
           <a:p>
             <a:fld id="{F4356D17-FE2B-4A42-AE6B-E0B8894B79EA}" type="datetimeFigureOut">
               <a:rPr lang="en-US" smtClean="0"/>
-              <a:t>7/19/19</a:t>
+              <a:t>7/20/19</a:t>
             </a:fld>
             <a:endParaRPr lang="en-US"/>
           </a:p>
@@ -2825,7 +2824,7 @@
           <a:p>
             <a:fld id="{F4356D17-FE2B-4A42-AE6B-E0B8894B79EA}" type="datetimeFigureOut">
               <a:rPr lang="en-US" smtClean="0"/>
-              <a:t>7/19/19</a:t>
+              <a:t>7/20/19</a:t>
             </a:fld>
             <a:endParaRPr lang="en-US"/>
           </a:p>
@@ -2943,7 +2942,7 @@
           <a:p>
             <a:fld id="{F4356D17-FE2B-4A42-AE6B-E0B8894B79EA}" type="datetimeFigureOut">
               <a:rPr lang="en-US" smtClean="0"/>
-              <a:t>7/19/19</a:t>
+              <a:t>7/20/19</a:t>
             </a:fld>
             <a:endParaRPr lang="en-US"/>
           </a:p>
@@ -3038,7 +3037,7 @@
           <a:p>
             <a:fld id="{F4356D17-FE2B-4A42-AE6B-E0B8894B79EA}" type="datetimeFigureOut">
               <a:rPr lang="en-US" smtClean="0"/>
-              <a:t>7/19/19</a:t>
+              <a:t>7/20/19</a:t>
             </a:fld>
             <a:endParaRPr lang="en-US"/>
           </a:p>
@@ -3315,7 +3314,7 @@
           <a:p>
             <a:fld id="{F4356D17-FE2B-4A42-AE6B-E0B8894B79EA}" type="datetimeFigureOut">
               <a:rPr lang="en-US" smtClean="0"/>
-              <a:t>7/19/19</a:t>
+              <a:t>7/20/19</a:t>
             </a:fld>
             <a:endParaRPr lang="en-US"/>
           </a:p>
@@ -3568,7 +3567,7 @@
           <a:p>
             <a:fld id="{F4356D17-FE2B-4A42-AE6B-E0B8894B79EA}" type="datetimeFigureOut">
               <a:rPr lang="en-US" smtClean="0"/>
-              <a:t>7/19/19</a:t>
+              <a:t>7/20/19</a:t>
             </a:fld>
             <a:endParaRPr lang="en-US"/>
           </a:p>
@@ -3781,7 +3780,7 @@
           <a:p>
             <a:fld id="{F4356D17-FE2B-4A42-AE6B-E0B8894B79EA}" type="datetimeFigureOut">
               <a:rPr lang="en-US" smtClean="0"/>
-              <a:t>7/19/19</a:t>
+              <a:t>7/20/19</a:t>
             </a:fld>
             <a:endParaRPr lang="en-US"/>
           </a:p>
@@ -4338,7 +4337,7 @@
 </p:sld>
 </file>
 
-<file path=ppt/slides/slide10.xml><?xml version="1.0" encoding="utf-8"?>
+<file path=ppt/slides/slide2.xml><?xml version="1.0" encoding="utf-8"?>
 <p:sld xmlns:a="http://schemas.openxmlformats.org/drawingml/2006/main" xmlns:r="http://schemas.openxmlformats.org/officeDocument/2006/relationships" xmlns:p="http://schemas.openxmlformats.org/presentationml/2006/main">
   <p:cSld>
     <p:spTree>
@@ -4362,93 +4361,80 @@
             <a:spLocks noGrp="1"/>
           </p:cNvSpPr>
           <p:nvPr>
-            <p:ph type="ctrTitle"/>
-          </p:nvPr>
-        </p:nvSpPr>
-        <p:spPr/>
-        <p:txBody>
-          <a:bodyPr/>
-          <a:lstStyle/>
-          <a:p>
-            <a:r>
-              <a:rPr lang="en-NZ" dirty="0"/>
-              <a:t>Questions?</a:t>
-            </a:r>
+            <p:ph type="title"/>
+          </p:nvPr>
+        </p:nvSpPr>
+        <p:spPr/>
+        <p:txBody>
+          <a:bodyPr/>
+          <a:lstStyle/>
+          <a:p>
+            <a:r>
+              <a:rPr lang="en-US" dirty="0"/>
+              <a:t>Today’s schedule</a:t>
+            </a:r>
+          </a:p>
+        </p:txBody>
+      </p:sp>
+      <p:sp>
+        <p:nvSpPr>
+          <p:cNvPr id="3" name="Content Placeholder 2"/>
+          <p:cNvSpPr>
+            <a:spLocks noGrp="1"/>
+          </p:cNvSpPr>
+          <p:nvPr>
+            <p:ph idx="1"/>
+          </p:nvPr>
+        </p:nvSpPr>
+        <p:spPr/>
+        <p:txBody>
+          <a:bodyPr/>
+          <a:lstStyle/>
+          <a:p>
+            <a:r>
+              <a:rPr lang="en-US" dirty="0"/>
+              <a:t>Introduction (10am)</a:t>
+            </a:r>
+          </a:p>
+          <a:p>
+            <a:r>
+              <a:rPr lang="en-US" dirty="0"/>
+              <a:t>User interface creation</a:t>
+            </a:r>
+          </a:p>
+          <a:p>
+            <a:r>
+              <a:rPr lang="en-US" dirty="0"/>
+              <a:t>Lunch (~1pm)</a:t>
+            </a:r>
+          </a:p>
+          <a:p>
+            <a:r>
+              <a:rPr lang="en-US" dirty="0"/>
+              <a:t>API + Database (~2pm)</a:t>
+            </a:r>
+          </a:p>
+          <a:p>
+            <a:r>
+              <a:rPr lang="en-US" dirty="0"/>
+              <a:t>Closing (4:30pm)</a:t>
+            </a:r>
+          </a:p>
+          <a:p>
+            <a:pPr marL="0" indent="0">
+              <a:buNone/>
+            </a:pPr>
+            <a:endParaRPr lang="en-US" dirty="0"/>
+          </a:p>
+          <a:p>
+            <a:endParaRPr lang="en-US" dirty="0"/>
           </a:p>
         </p:txBody>
       </p:sp>
     </p:spTree>
     <p:extLst>
       <p:ext uri="{BB962C8B-B14F-4D97-AF65-F5344CB8AC3E}">
-        <p14:creationId xmlns:p14="http://schemas.microsoft.com/office/powerpoint/2010/main" val="1510407067"/>
-      </p:ext>
-    </p:extLst>
-  </p:cSld>
-  <p:clrMapOvr>
-    <a:masterClrMapping/>
-  </p:clrMapOvr>
-</p:sld>
-</file>
-
-<file path=ppt/slides/slide2.xml><?xml version="1.0" encoding="utf-8"?>
-<p:sld xmlns:a="http://schemas.openxmlformats.org/drawingml/2006/main" xmlns:r="http://schemas.openxmlformats.org/officeDocument/2006/relationships" xmlns:p="http://schemas.openxmlformats.org/presentationml/2006/main">
-  <p:cSld>
-    <p:bg>
-      <p:bgPr>
-        <a:solidFill>
-          <a:schemeClr val="bg1"/>
-        </a:solidFill>
-        <a:effectLst/>
-      </p:bgPr>
-    </p:bg>
-    <p:spTree>
-      <p:nvGrpSpPr>
-        <p:cNvPr id="1" name=""/>
-        <p:cNvGrpSpPr/>
-        <p:nvPr/>
-      </p:nvGrpSpPr>
-      <p:grpSpPr>
-        <a:xfrm>
-          <a:off x="0" y="0"/>
-          <a:ext cx="0" cy="0"/>
-          <a:chOff x="0" y="0"/>
-          <a:chExt cx="0" cy="0"/>
-        </a:xfrm>
-      </p:grpSpPr>
-      <p:pic>
-        <p:nvPicPr>
-          <p:cNvPr id="7" name="Picture 6">
-            <a:extLst>
-              <a:ext uri="{FF2B5EF4-FFF2-40B4-BE49-F238E27FC236}">
-                <a16:creationId xmlns:a16="http://schemas.microsoft.com/office/drawing/2014/main" id="{25F384F7-F228-454D-81AF-2F0D62F931C2}"/>
-              </a:ext>
-            </a:extLst>
-          </p:cNvPr>
-          <p:cNvPicPr>
-            <a:picLocks noChangeAspect="1"/>
-          </p:cNvPicPr>
-          <p:nvPr/>
-        </p:nvPicPr>
-        <p:blipFill>
-          <a:blip r:embed="rId2"/>
-          <a:stretch>
-            <a:fillRect/>
-          </a:stretch>
-        </p:blipFill>
-        <p:spPr>
-          <a:xfrm>
-            <a:off x="2661943" y="231986"/>
-            <a:ext cx="7119574" cy="5571067"/>
-          </a:xfrm>
-          <a:prstGeom prst="rect">
-            <a:avLst/>
-          </a:prstGeom>
-        </p:spPr>
-      </p:pic>
-    </p:spTree>
-    <p:extLst>
-      <p:ext uri="{BB962C8B-B14F-4D97-AF65-F5344CB8AC3E}">
-        <p14:creationId xmlns:p14="http://schemas.microsoft.com/office/powerpoint/2010/main" val="3140971492"/>
+        <p14:creationId xmlns:p14="http://schemas.microsoft.com/office/powerpoint/2010/main" val="4233348229"/>
       </p:ext>
     </p:extLst>
   </p:cSld>
@@ -4492,7 +4478,7 @@
           <a:p>
             <a:r>
               <a:rPr lang="en-US" dirty="0"/>
-              <a:t>Today’s schedule</a:t>
+              <a:t>Tomorrow’s schedule</a:t>
             </a:r>
           </a:p>
         </p:txBody>
@@ -4509,7 +4495,9 @@
         </p:nvSpPr>
         <p:spPr/>
         <p:txBody>
-          <a:bodyPr/>
+          <a:bodyPr>
+            <a:normAutofit fontScale="92500" lnSpcReduction="20000"/>
+          </a:bodyPr>
           <a:lstStyle/>
           <a:p>
             <a:r>
@@ -4520,37 +4508,58 @@
           <a:p>
             <a:r>
               <a:rPr lang="en-US" dirty="0"/>
-              <a:t>GitHub </a:t>
+              <a:t>Deployment </a:t>
             </a:r>
           </a:p>
           <a:p>
             <a:r>
               <a:rPr lang="en-US" dirty="0"/>
-              <a:t>User interface creation</a:t>
+              <a:t>Unit testing /Dev ops</a:t>
             </a:r>
           </a:p>
           <a:p>
             <a:r>
               <a:rPr lang="en-US" dirty="0"/>
-              <a:t>Lunch (~12pm)</a:t>
+              <a:t>Lunch (~1pm)</a:t>
             </a:r>
           </a:p>
           <a:p>
             <a:r>
               <a:rPr lang="en-US" dirty="0"/>
-              <a:t>All things API (1:30pm)</a:t>
+              <a:t>Accessibility(~2pm)</a:t>
             </a:r>
           </a:p>
           <a:p>
             <a:r>
               <a:rPr lang="en-US" dirty="0"/>
-              <a:t>Closing (4:30pm)</a:t>
-            </a:r>
-          </a:p>
-          <a:p>
-            <a:pPr marL="0" indent="0">
-              <a:buNone/>
-            </a:pPr>
+              <a:t>Authentication</a:t>
+            </a:r>
+          </a:p>
+          <a:p>
+            <a:r>
+              <a:rPr lang="en-US" dirty="0"/>
+              <a:t>Signal R</a:t>
+            </a:r>
+          </a:p>
+          <a:p>
+            <a:r>
+              <a:rPr lang="en-US" dirty="0"/>
+              <a:t>Expectations on other advanced features. (3:30pm)</a:t>
+            </a:r>
+          </a:p>
+          <a:p>
+            <a:r>
+              <a:rPr lang="en-US" dirty="0"/>
+              <a:t>Assessment briefing / Imagine Cup</a:t>
+            </a:r>
+          </a:p>
+          <a:p>
+            <a:r>
+              <a:rPr lang="en-US" dirty="0"/>
+              <a:t>Closing (4:00pm)</a:t>
+            </a:r>
+          </a:p>
+          <a:p>
             <a:endParaRPr lang="en-US" dirty="0"/>
           </a:p>
           <a:p>
@@ -4561,7 +4570,7 @@
     </p:spTree>
     <p:extLst>
       <p:ext uri="{BB962C8B-B14F-4D97-AF65-F5344CB8AC3E}">
-        <p14:creationId xmlns:p14="http://schemas.microsoft.com/office/powerpoint/2010/main" val="4233348229"/>
+        <p14:creationId xmlns:p14="http://schemas.microsoft.com/office/powerpoint/2010/main" val="1473513844"/>
       </p:ext>
     </p:extLst>
   </p:cSld>
@@ -4605,14 +4614,18 @@
           <a:p>
             <a:r>
               <a:rPr lang="en-US" dirty="0"/>
-              <a:t>Tomorrow’s schedule</a:t>
-            </a:r>
-          </a:p>
-        </p:txBody>
-      </p:sp>
-      <p:sp>
-        <p:nvSpPr>
-          <p:cNvPr id="3" name="Content Placeholder 2"/>
+              <a:t>Assessment</a:t>
+            </a:r>
+            <a:endParaRPr lang="en-US" dirty="0">
+              <a:latin typeface="Segoe UI Light" panose="020B0502040204020203" pitchFamily="34" charset="0"/>
+              <a:cs typeface="Segoe UI Light" panose="020B0502040204020203" pitchFamily="34" charset="0"/>
+            </a:endParaRPr>
+          </a:p>
+        </p:txBody>
+      </p:sp>
+      <p:sp>
+        <p:nvSpPr>
+          <p:cNvPr id="5" name="Content Placeholder 4"/>
           <p:cNvSpPr>
             <a:spLocks noGrp="1"/>
           </p:cNvSpPr>
@@ -4622,76 +4635,66 @@
         </p:nvSpPr>
         <p:spPr/>
         <p:txBody>
-          <a:bodyPr>
-            <a:normAutofit lnSpcReduction="10000"/>
-          </a:bodyPr>
-          <a:lstStyle/>
-          <a:p>
-            <a:r>
-              <a:rPr lang="en-US" dirty="0"/>
-              <a:t>Introduction 10am</a:t>
-            </a:r>
-          </a:p>
-          <a:p>
-            <a:r>
-              <a:rPr lang="en-US" dirty="0"/>
-              <a:t>Deployment </a:t>
-            </a:r>
-          </a:p>
-          <a:p>
-            <a:r>
-              <a:rPr lang="en-US" dirty="0"/>
-              <a:t>Unit testing</a:t>
-            </a:r>
-          </a:p>
-          <a:p>
-            <a:r>
-              <a:rPr lang="en-US" dirty="0"/>
-              <a:t>Lunch (~12pm)</a:t>
-            </a:r>
-          </a:p>
-          <a:p>
-            <a:r>
-              <a:rPr lang="en-US" dirty="0"/>
-              <a:t>Accessibility(1:30pm)</a:t>
-            </a:r>
-          </a:p>
-          <a:p>
-            <a:r>
-              <a:rPr lang="en-US" dirty="0"/>
-              <a:t>Authentication</a:t>
-            </a:r>
-          </a:p>
-          <a:p>
-            <a:r>
-              <a:rPr lang="en-US" dirty="0"/>
-              <a:t>Expectations on other advanced features. (3:30pm)</a:t>
-            </a:r>
-          </a:p>
-          <a:p>
-            <a:r>
-              <a:rPr lang="en-US" dirty="0"/>
-              <a:t>Assessment briefing / Imagine Cup</a:t>
-            </a:r>
-          </a:p>
-          <a:p>
-            <a:r>
-              <a:rPr lang="en-US" dirty="0"/>
-              <a:t>Closing (4:00pm)</a:t>
-            </a:r>
-          </a:p>
-          <a:p>
-            <a:endParaRPr lang="en-US" dirty="0"/>
-          </a:p>
-          <a:p>
-            <a:endParaRPr lang="en-US" dirty="0"/>
+          <a:bodyPr/>
+          <a:lstStyle/>
+          <a:p>
+            <a:r>
+              <a:rPr lang="en-NZ" dirty="0"/>
+              <a:t>17</a:t>
+            </a:r>
+            <a:r>
+              <a:rPr lang="en-NZ" baseline="30000" dirty="0"/>
+              <a:t>th</a:t>
+            </a:r>
+            <a:r>
+              <a:rPr lang="en-NZ" dirty="0"/>
+              <a:t> August 2019</a:t>
+            </a:r>
+          </a:p>
+          <a:p>
+            <a:r>
+              <a:rPr lang="en-NZ" dirty="0"/>
+              <a:t>You must pass the in-person assessment to get placement</a:t>
+            </a:r>
+          </a:p>
+          <a:p>
+            <a:r>
+              <a:rPr lang="en-NZ" dirty="0"/>
+              <a:t>We assess both your technical skills and your soft skills.</a:t>
+            </a:r>
+          </a:p>
+          <a:p>
+            <a:r>
+              <a:rPr lang="en-NZ" dirty="0"/>
+              <a:t>We will release the criteria tomorrow.</a:t>
+            </a:r>
+          </a:p>
+          <a:p>
+            <a:r>
+              <a:rPr lang="en-NZ" b="1" dirty="0"/>
+              <a:t>Do NOT plagiarise </a:t>
+            </a:r>
+          </a:p>
+          <a:p>
+            <a:r>
+              <a:rPr lang="en-NZ" dirty="0"/>
+              <a:t>You will book your </a:t>
+            </a:r>
+            <a:r>
+              <a:rPr lang="en-NZ" b="1" dirty="0"/>
+              <a:t>interview</a:t>
+            </a:r>
+            <a:r>
+              <a:rPr lang="en-NZ" dirty="0"/>
+              <a:t> time, we will share the link tomorrow. </a:t>
+            </a:r>
           </a:p>
         </p:txBody>
       </p:sp>
     </p:spTree>
     <p:extLst>
       <p:ext uri="{BB962C8B-B14F-4D97-AF65-F5344CB8AC3E}">
-        <p14:creationId xmlns:p14="http://schemas.microsoft.com/office/powerpoint/2010/main" val="1473513844"/>
+        <p14:creationId xmlns:p14="http://schemas.microsoft.com/office/powerpoint/2010/main" val="1599382233"/>
       </p:ext>
     </p:extLst>
   </p:cSld>
@@ -4735,7 +4738,7 @@
           <a:p>
             <a:r>
               <a:rPr lang="en-US" dirty="0"/>
-              <a:t>Assessment</a:t>
+              <a:t>Imagine Cup</a:t>
             </a:r>
             <a:endParaRPr lang="en-US" dirty="0">
               <a:latin typeface="Segoe UI Light" panose="020B0502040204020203" pitchFamily="34" charset="0"/>
@@ -4761,61 +4764,29 @@
           <a:p>
             <a:r>
               <a:rPr lang="en-NZ" dirty="0"/>
-              <a:t>17</a:t>
-            </a:r>
-            <a:r>
-              <a:rPr lang="en-NZ" baseline="30000" dirty="0"/>
-              <a:t>th</a:t>
-            </a:r>
+              <a:t>All MSA students get direct entry to the Imagine Cup</a:t>
+            </a:r>
+          </a:p>
+          <a:p>
             <a:r>
               <a:rPr lang="en-NZ" dirty="0"/>
-              <a:t> August 2019</a:t>
-            </a:r>
-          </a:p>
-          <a:p>
-            <a:r>
-              <a:rPr lang="en-NZ" dirty="0"/>
-              <a:t>You must pass the in-person assessment to get placement</a:t>
-            </a:r>
-          </a:p>
-          <a:p>
-            <a:r>
-              <a:rPr lang="en-NZ" dirty="0"/>
-              <a:t>We assess both your technical skills and your soft skills.</a:t>
-            </a:r>
-          </a:p>
-          <a:p>
-            <a:r>
-              <a:rPr lang="en-NZ" dirty="0"/>
-              <a:t>We will release the criteria tomorrow.</a:t>
-            </a:r>
-          </a:p>
-          <a:p>
-            <a:r>
-              <a:rPr lang="en-NZ" b="1" dirty="0"/>
-              <a:t>Do NOT plagiarise </a:t>
-            </a:r>
-          </a:p>
-          <a:p>
-            <a:r>
-              <a:rPr lang="en-NZ" dirty="0"/>
-              <a:t>You will book your </a:t>
-            </a:r>
-            <a:r>
-              <a:rPr lang="en-NZ" b="1" dirty="0"/>
-              <a:t>interview</a:t>
-            </a:r>
-            <a:r>
-              <a:rPr lang="en-NZ" dirty="0"/>
-              <a:t> time, we will share the link tomorrow. </a:t>
-            </a:r>
+              <a:t>We will share more details with you at the soft skills event.</a:t>
+            </a:r>
+          </a:p>
+          <a:p>
+            <a:pPr marL="0" indent="0">
+              <a:buNone/>
+            </a:pPr>
+            <a:endParaRPr lang="en-NZ" dirty="0">
+              <a:hlinkClick r:id="" action="ppaction://noaction"/>
+            </a:endParaRPr>
           </a:p>
         </p:txBody>
       </p:sp>
     </p:spTree>
     <p:extLst>
       <p:ext uri="{BB962C8B-B14F-4D97-AF65-F5344CB8AC3E}">
-        <p14:creationId xmlns:p14="http://schemas.microsoft.com/office/powerpoint/2010/main" val="1599382233"/>
+        <p14:creationId xmlns:p14="http://schemas.microsoft.com/office/powerpoint/2010/main" val="3282137833"/>
       </p:ext>
     </p:extLst>
   </p:cSld>
@@ -4859,98 +4830,6 @@
           <a:p>
             <a:r>
               <a:rPr lang="en-US" dirty="0"/>
-              <a:t>Imagine Cup</a:t>
-            </a:r>
-            <a:endParaRPr lang="en-US" dirty="0">
-              <a:latin typeface="Segoe UI Light" panose="020B0502040204020203" pitchFamily="34" charset="0"/>
-              <a:cs typeface="Segoe UI Light" panose="020B0502040204020203" pitchFamily="34" charset="0"/>
-            </a:endParaRPr>
-          </a:p>
-        </p:txBody>
-      </p:sp>
-      <p:sp>
-        <p:nvSpPr>
-          <p:cNvPr id="5" name="Content Placeholder 4"/>
-          <p:cNvSpPr>
-            <a:spLocks noGrp="1"/>
-          </p:cNvSpPr>
-          <p:nvPr>
-            <p:ph idx="1"/>
-          </p:nvPr>
-        </p:nvSpPr>
-        <p:spPr/>
-        <p:txBody>
-          <a:bodyPr/>
-          <a:lstStyle/>
-          <a:p>
-            <a:r>
-              <a:rPr lang="en-NZ" dirty="0"/>
-              <a:t>All MSA students get direct entry to the Imagine Cup</a:t>
-            </a:r>
-          </a:p>
-          <a:p>
-            <a:r>
-              <a:rPr lang="en-NZ" dirty="0"/>
-              <a:t>We will share more details with you at the soft skills event.</a:t>
-            </a:r>
-          </a:p>
-          <a:p>
-            <a:pPr marL="0" indent="0">
-              <a:buNone/>
-            </a:pPr>
-            <a:endParaRPr lang="en-NZ" dirty="0">
-              <a:hlinkClick r:id="" action="ppaction://noaction"/>
-            </a:endParaRPr>
-          </a:p>
-        </p:txBody>
-      </p:sp>
-    </p:spTree>
-    <p:extLst>
-      <p:ext uri="{BB962C8B-B14F-4D97-AF65-F5344CB8AC3E}">
-        <p14:creationId xmlns:p14="http://schemas.microsoft.com/office/powerpoint/2010/main" val="3282137833"/>
-      </p:ext>
-    </p:extLst>
-  </p:cSld>
-  <p:clrMapOvr>
-    <a:masterClrMapping/>
-  </p:clrMapOvr>
-</p:sld>
-</file>
-
-<file path=ppt/slides/slide7.xml><?xml version="1.0" encoding="utf-8"?>
-<p:sld xmlns:a="http://schemas.openxmlformats.org/drawingml/2006/main" xmlns:r="http://schemas.openxmlformats.org/officeDocument/2006/relationships" xmlns:p="http://schemas.openxmlformats.org/presentationml/2006/main">
-  <p:cSld>
-    <p:spTree>
-      <p:nvGrpSpPr>
-        <p:cNvPr id="1" name=""/>
-        <p:cNvGrpSpPr/>
-        <p:nvPr/>
-      </p:nvGrpSpPr>
-      <p:grpSpPr>
-        <a:xfrm>
-          <a:off x="0" y="0"/>
-          <a:ext cx="0" cy="0"/>
-          <a:chOff x="0" y="0"/>
-          <a:chExt cx="0" cy="0"/>
-        </a:xfrm>
-      </p:grpSpPr>
-      <p:sp>
-        <p:nvSpPr>
-          <p:cNvPr id="2" name="Title 1"/>
-          <p:cNvSpPr>
-            <a:spLocks noGrp="1"/>
-          </p:cNvSpPr>
-          <p:nvPr>
-            <p:ph type="title"/>
-          </p:nvPr>
-        </p:nvSpPr>
-        <p:spPr/>
-        <p:txBody>
-          <a:bodyPr/>
-          <a:lstStyle/>
-          <a:p>
-            <a:r>
-              <a:rPr lang="en-US" dirty="0"/>
               <a:t>FAQs</a:t>
             </a:r>
             <a:endParaRPr lang="en-US" dirty="0">
@@ -5003,7 +4882,7 @@
 </p:sld>
 </file>
 
-<file path=ppt/slides/slide8.xml><?xml version="1.0" encoding="utf-8"?>
+<file path=ppt/slides/slide7.xml><?xml version="1.0" encoding="utf-8"?>
 <p:sld xmlns:a="http://schemas.openxmlformats.org/drawingml/2006/main" xmlns:r="http://schemas.openxmlformats.org/officeDocument/2006/relationships" xmlns:p="http://schemas.openxmlformats.org/presentationml/2006/main">
   <p:cSld>
     <p:spTree>
@@ -5212,7 +5091,7 @@
 </p:sld>
 </file>
 
-<file path=ppt/slides/slide9.xml><?xml version="1.0" encoding="utf-8"?>
+<file path=ppt/slides/slide8.xml><?xml version="1.0" encoding="utf-8"?>
 <p:sld xmlns:a="http://schemas.openxmlformats.org/drawingml/2006/main" xmlns:r="http://schemas.openxmlformats.org/officeDocument/2006/relationships" xmlns:p="http://schemas.openxmlformats.org/presentationml/2006/main">
   <p:cSld>
     <p:spTree>
@@ -5288,6 +5167,58 @@
     <p:extLst>
       <p:ext uri="{BB962C8B-B14F-4D97-AF65-F5344CB8AC3E}">
         <p14:creationId xmlns:p14="http://schemas.microsoft.com/office/powerpoint/2010/main" val="2151758917"/>
+      </p:ext>
+    </p:extLst>
+  </p:cSld>
+  <p:clrMapOvr>
+    <a:masterClrMapping/>
+  </p:clrMapOvr>
+</p:sld>
+</file>
+
+<file path=ppt/slides/slide9.xml><?xml version="1.0" encoding="utf-8"?>
+<p:sld xmlns:a="http://schemas.openxmlformats.org/drawingml/2006/main" xmlns:r="http://schemas.openxmlformats.org/officeDocument/2006/relationships" xmlns:p="http://schemas.openxmlformats.org/presentationml/2006/main">
+  <p:cSld>
+    <p:spTree>
+      <p:nvGrpSpPr>
+        <p:cNvPr id="1" name=""/>
+        <p:cNvGrpSpPr/>
+        <p:nvPr/>
+      </p:nvGrpSpPr>
+      <p:grpSpPr>
+        <a:xfrm>
+          <a:off x="0" y="0"/>
+          <a:ext cx="0" cy="0"/>
+          <a:chOff x="0" y="0"/>
+          <a:chExt cx="0" cy="0"/>
+        </a:xfrm>
+      </p:grpSpPr>
+      <p:sp>
+        <p:nvSpPr>
+          <p:cNvPr id="2" name="Title 1"/>
+          <p:cNvSpPr>
+            <a:spLocks noGrp="1"/>
+          </p:cNvSpPr>
+          <p:nvPr>
+            <p:ph type="ctrTitle"/>
+          </p:nvPr>
+        </p:nvSpPr>
+        <p:spPr/>
+        <p:txBody>
+          <a:bodyPr/>
+          <a:lstStyle/>
+          <a:p>
+            <a:r>
+              <a:rPr lang="en-NZ" dirty="0"/>
+              <a:t>Questions?</a:t>
+            </a:r>
+          </a:p>
+        </p:txBody>
+      </p:sp>
+    </p:spTree>
+    <p:extLst>
+      <p:ext uri="{BB962C8B-B14F-4D97-AF65-F5344CB8AC3E}">
+        <p14:creationId xmlns:p14="http://schemas.microsoft.com/office/powerpoint/2010/main" val="1510407067"/>
       </p:ext>
     </p:extLst>
   </p:cSld>

</xml_diff>

<commit_message>
Updated day 2 schedule
</commit_message>
<xml_diff>
--- a/Slides/MSA Intro Day 1.pptx
+++ b/Slides/MSA Intro Day 1.pptx
@@ -216,7 +216,7 @@
           <a:p>
             <a:fld id="{53D551F1-3E25-2744-9BE7-0A04F579F8FB}" type="datetimeFigureOut">
               <a:rPr lang="en-US" smtClean="0"/>
-              <a:t>7/20/19</a:t>
+              <a:t>7/21/19</a:t>
             </a:fld>
             <a:endParaRPr lang="en-US"/>
           </a:p>
@@ -1135,7 +1135,7 @@
           <a:p>
             <a:fld id="{F4356D17-FE2B-4A42-AE6B-E0B8894B79EA}" type="datetimeFigureOut">
               <a:rPr lang="en-US" smtClean="0"/>
-              <a:t>7/20/19</a:t>
+              <a:t>7/21/19</a:t>
             </a:fld>
             <a:endParaRPr lang="en-US"/>
           </a:p>
@@ -1305,7 +1305,7 @@
           <a:p>
             <a:fld id="{F4356D17-FE2B-4A42-AE6B-E0B8894B79EA}" type="datetimeFigureOut">
               <a:rPr lang="en-US" smtClean="0"/>
-              <a:t>7/20/19</a:t>
+              <a:t>7/21/19</a:t>
             </a:fld>
             <a:endParaRPr lang="en-US"/>
           </a:p>
@@ -1485,7 +1485,7 @@
           <a:p>
             <a:fld id="{F4356D17-FE2B-4A42-AE6B-E0B8894B79EA}" type="datetimeFigureOut">
               <a:rPr lang="en-US" smtClean="0"/>
-              <a:t>7/20/19</a:t>
+              <a:t>7/21/19</a:t>
             </a:fld>
             <a:endParaRPr lang="en-US"/>
           </a:p>
@@ -1979,7 +1979,7 @@
           <a:p>
             <a:fld id="{F4356D17-FE2B-4A42-AE6B-E0B8894B79EA}" type="datetimeFigureOut">
               <a:rPr lang="en-US" smtClean="0"/>
-              <a:t>7/20/19</a:t>
+              <a:t>7/21/19</a:t>
             </a:fld>
             <a:endParaRPr lang="en-US"/>
           </a:p>
@@ -2225,7 +2225,7 @@
           <a:p>
             <a:fld id="{F4356D17-FE2B-4A42-AE6B-E0B8894B79EA}" type="datetimeFigureOut">
               <a:rPr lang="en-US" smtClean="0"/>
-              <a:t>7/20/19</a:t>
+              <a:t>7/21/19</a:t>
             </a:fld>
             <a:endParaRPr lang="en-US"/>
           </a:p>
@@ -2457,7 +2457,7 @@
           <a:p>
             <a:fld id="{F4356D17-FE2B-4A42-AE6B-E0B8894B79EA}" type="datetimeFigureOut">
               <a:rPr lang="en-US" smtClean="0"/>
-              <a:t>7/20/19</a:t>
+              <a:t>7/21/19</a:t>
             </a:fld>
             <a:endParaRPr lang="en-US"/>
           </a:p>
@@ -2824,7 +2824,7 @@
           <a:p>
             <a:fld id="{F4356D17-FE2B-4A42-AE6B-E0B8894B79EA}" type="datetimeFigureOut">
               <a:rPr lang="en-US" smtClean="0"/>
-              <a:t>7/20/19</a:t>
+              <a:t>7/21/19</a:t>
             </a:fld>
             <a:endParaRPr lang="en-US"/>
           </a:p>
@@ -2942,7 +2942,7 @@
           <a:p>
             <a:fld id="{F4356D17-FE2B-4A42-AE6B-E0B8894B79EA}" type="datetimeFigureOut">
               <a:rPr lang="en-US" smtClean="0"/>
-              <a:t>7/20/19</a:t>
+              <a:t>7/21/19</a:t>
             </a:fld>
             <a:endParaRPr lang="en-US"/>
           </a:p>
@@ -3037,7 +3037,7 @@
           <a:p>
             <a:fld id="{F4356D17-FE2B-4A42-AE6B-E0B8894B79EA}" type="datetimeFigureOut">
               <a:rPr lang="en-US" smtClean="0"/>
-              <a:t>7/20/19</a:t>
+              <a:t>7/21/19</a:t>
             </a:fld>
             <a:endParaRPr lang="en-US"/>
           </a:p>
@@ -3314,7 +3314,7 @@
           <a:p>
             <a:fld id="{F4356D17-FE2B-4A42-AE6B-E0B8894B79EA}" type="datetimeFigureOut">
               <a:rPr lang="en-US" smtClean="0"/>
-              <a:t>7/20/19</a:t>
+              <a:t>7/21/19</a:t>
             </a:fld>
             <a:endParaRPr lang="en-US"/>
           </a:p>
@@ -3567,7 +3567,7 @@
           <a:p>
             <a:fld id="{F4356D17-FE2B-4A42-AE6B-E0B8894B79EA}" type="datetimeFigureOut">
               <a:rPr lang="en-US" smtClean="0"/>
-              <a:t>7/20/19</a:t>
+              <a:t>7/21/19</a:t>
             </a:fld>
             <a:endParaRPr lang="en-US"/>
           </a:p>
@@ -3780,7 +3780,7 @@
           <a:p>
             <a:fld id="{F4356D17-FE2B-4A42-AE6B-E0B8894B79EA}" type="datetimeFigureOut">
               <a:rPr lang="en-US" smtClean="0"/>
-              <a:t>7/20/19</a:t>
+              <a:t>7/21/19</a:t>
             </a:fld>
             <a:endParaRPr lang="en-US"/>
           </a:p>
@@ -4496,7 +4496,7 @@
         <p:spPr/>
         <p:txBody>
           <a:bodyPr>
-            <a:normAutofit fontScale="92500" lnSpcReduction="20000"/>
+            <a:normAutofit fontScale="85000" lnSpcReduction="20000"/>
           </a:bodyPr>
           <a:lstStyle/>
           <a:p>
@@ -4508,13 +4508,13 @@
           <a:p>
             <a:r>
               <a:rPr lang="en-US" dirty="0"/>
+              <a:t>API continued – Transcription, Search Transcription, Update favorites</a:t>
+            </a:r>
+          </a:p>
+          <a:p>
+            <a:r>
+              <a:rPr lang="en-US" dirty="0"/>
               <a:t>Deployment </a:t>
-            </a:r>
-          </a:p>
-          <a:p>
-            <a:r>
-              <a:rPr lang="en-US" dirty="0"/>
-              <a:t>Unit testing /Dev ops</a:t>
             </a:r>
           </a:p>
           <a:p>
@@ -4526,7 +4526,13 @@
           <a:p>
             <a:r>
               <a:rPr lang="en-US" dirty="0"/>
-              <a:t>Accessibility(~2pm)</a:t>
+              <a:t>Unit testing /Dev ops(~2pm)</a:t>
+            </a:r>
+          </a:p>
+          <a:p>
+            <a:r>
+              <a:rPr lang="en-US" dirty="0"/>
+              <a:t>Accessibility</a:t>
             </a:r>
           </a:p>
           <a:p>
@@ -4538,25 +4544,25 @@
           <a:p>
             <a:r>
               <a:rPr lang="en-US" dirty="0"/>
-              <a:t>Signal R</a:t>
+              <a:t>Signal R – (Time permitting)</a:t>
             </a:r>
           </a:p>
           <a:p>
             <a:r>
               <a:rPr lang="en-US" dirty="0"/>
-              <a:t>Expectations on other advanced features. (3:30pm)</a:t>
+              <a:t>Expectations on other advanced features. (4pm)</a:t>
             </a:r>
           </a:p>
           <a:p>
             <a:r>
               <a:rPr lang="en-US" dirty="0"/>
-              <a:t>Assessment briefing / Imagine Cup</a:t>
+              <a:t>Assessment briefing </a:t>
             </a:r>
           </a:p>
           <a:p>
             <a:r>
               <a:rPr lang="en-US" dirty="0"/>
-              <a:t>Closing (4:00pm)</a:t>
+              <a:t>Closing (4:30pm)</a:t>
             </a:r>
           </a:p>
           <a:p>

</xml_diff>